<commit_message>
Funcionalidades de android + Idenficacao
</commit_message>
<xml_diff>
--- a/Fitness League.pptx
+++ b/Fitness League.pptx
@@ -13,6 +13,7 @@
     <p:sldId id="261" r:id="rId7"/>
     <p:sldId id="262" r:id="rId8"/>
     <p:sldId id="263" r:id="rId9"/>
+    <p:sldId id="264" r:id="rId10"/>
   </p:sldIdLst>
   <p:sldSz cx="12192000" cy="6858000"/>
   <p:notesSz cx="6858000" cy="9144000"/>
@@ -3469,12 +3470,8 @@
           <a:lstStyle/>
           <a:p>
             <a:r>
-              <a:rPr lang="pt-PT" dirty="0" err="1"/>
-              <a:t>Objectivo</a:t>
-            </a:r>
-            <a:r>
-              <a:rPr lang="pt-PT" dirty="0"/>
-              <a:t> do Projeto</a:t>
+              <a:rPr lang="pt-PT" dirty="0"/>
+              <a:t>Objetivo do Projeto</a:t>
             </a:r>
           </a:p>
           <a:p>
@@ -3572,7 +3569,7 @@
           <a:p>
             <a:r>
               <a:rPr lang="pt-PT" dirty="0"/>
-              <a:t>Criar uma plataforma para ajudar os clientes a poderem treinar tanto num ginásio como em casa</a:t>
+              <a:t>Criar uma plataforma para ajudar os clientes a poderem treinar tanto num ginásio como em casa.</a:t>
             </a:r>
           </a:p>
         </p:txBody>
@@ -4191,7 +4188,71 @@
           <a:bodyPr/>
           <a:lstStyle/>
           <a:p>
-            <a:endParaRPr lang="pt-PT"/>
+            <a:r>
+              <a:rPr lang="pt-PT" dirty="0"/>
+              <a:t>Cliente:</a:t>
+            </a:r>
+          </a:p>
+          <a:p>
+            <a:pPr lvl="1"/>
+            <a:r>
+              <a:rPr lang="pt-PT" dirty="0"/>
+              <a:t>Fazer Login (sem login feito não consegue aceder a nada)</a:t>
+            </a:r>
+          </a:p>
+          <a:p>
+            <a:pPr lvl="1"/>
+            <a:r>
+              <a:rPr lang="pt-PT" dirty="0"/>
+              <a:t>Consultar Perfil</a:t>
+            </a:r>
+          </a:p>
+          <a:p>
+            <a:pPr lvl="1"/>
+            <a:r>
+              <a:rPr lang="pt-PT" dirty="0"/>
+              <a:t>Consultar os seus Planos de Treino</a:t>
+            </a:r>
+          </a:p>
+          <a:p>
+            <a:pPr lvl="1"/>
+            <a:r>
+              <a:rPr lang="pt-PT" dirty="0"/>
+              <a:t>Consultar os seus Planos de Nutrição</a:t>
+            </a:r>
+          </a:p>
+          <a:p>
+            <a:pPr lvl="1"/>
+            <a:r>
+              <a:rPr lang="pt-PT" dirty="0"/>
+              <a:t>Calcular IMC (Índice de Massa Corporal)</a:t>
+            </a:r>
+          </a:p>
+          <a:p>
+            <a:pPr lvl="1"/>
+            <a:r>
+              <a:rPr lang="pt-PT" dirty="0"/>
+              <a:t>Consultar Calendário de Aulas de Grupo</a:t>
+            </a:r>
+          </a:p>
+          <a:p>
+            <a:pPr lvl="1"/>
+            <a:r>
+              <a:rPr lang="pt-PT" dirty="0"/>
+              <a:t>Consultar Página Informativa do Ginásio</a:t>
+            </a:r>
+          </a:p>
+          <a:p>
+            <a:pPr lvl="1"/>
+            <a:r>
+              <a:rPr lang="pt-PT" dirty="0"/>
+              <a:t>Fazer </a:t>
+            </a:r>
+            <a:r>
+              <a:rPr lang="pt-PT" dirty="0" err="1"/>
+              <a:t>Logout</a:t>
+            </a:r>
+            <a:endParaRPr lang="pt-PT" dirty="0"/>
           </a:p>
         </p:txBody>
       </p:sp>
@@ -4199,6 +4260,131 @@
     <p:extLst>
       <p:ext uri="{BB962C8B-B14F-4D97-AF65-F5344CB8AC3E}">
         <p14:creationId xmlns:p14="http://schemas.microsoft.com/office/powerpoint/2010/main" val="3796398538"/>
+      </p:ext>
+    </p:extLst>
+  </p:cSld>
+  <p:clrMapOvr>
+    <a:masterClrMapping/>
+  </p:clrMapOvr>
+</p:sld>
+</file>
+
+<file path=ppt/slides/slide9.xml><?xml version="1.0" encoding="utf-8"?>
+<p:sld xmlns:a="http://schemas.openxmlformats.org/drawingml/2006/main" xmlns:r="http://schemas.openxmlformats.org/officeDocument/2006/relationships" xmlns:p="http://schemas.openxmlformats.org/presentationml/2006/main">
+  <p:cSld>
+    <p:spTree>
+      <p:nvGrpSpPr>
+        <p:cNvPr id="1" name=""/>
+        <p:cNvGrpSpPr/>
+        <p:nvPr/>
+      </p:nvGrpSpPr>
+      <p:grpSpPr>
+        <a:xfrm>
+          <a:off x="0" y="0"/>
+          <a:ext cx="0" cy="0"/>
+          <a:chOff x="0" y="0"/>
+          <a:chExt cx="0" cy="0"/>
+        </a:xfrm>
+      </p:grpSpPr>
+      <p:sp>
+        <p:nvSpPr>
+          <p:cNvPr id="2" name="Título 1">
+            <a:extLst>
+              <a:ext uri="{FF2B5EF4-FFF2-40B4-BE49-F238E27FC236}">
+                <a16:creationId xmlns:a16="http://schemas.microsoft.com/office/drawing/2014/main" id="{7BAC615A-14C5-4653-AD4B-136FA1EDD3A6}"/>
+              </a:ext>
+            </a:extLst>
+          </p:cNvPr>
+          <p:cNvSpPr>
+            <a:spLocks noGrp="1"/>
+          </p:cNvSpPr>
+          <p:nvPr>
+            <p:ph type="title"/>
+          </p:nvPr>
+        </p:nvSpPr>
+        <p:spPr/>
+        <p:txBody>
+          <a:bodyPr/>
+          <a:lstStyle/>
+          <a:p>
+            <a:r>
+              <a:rPr lang="pt-PT" dirty="0"/>
+              <a:t>Identificação das funcionalidades propostas mas não implementadas</a:t>
+            </a:r>
+          </a:p>
+        </p:txBody>
+      </p:sp>
+      <p:sp>
+        <p:nvSpPr>
+          <p:cNvPr id="3" name="Marcador de Posição de Conteúdo 2">
+            <a:extLst>
+              <a:ext uri="{FF2B5EF4-FFF2-40B4-BE49-F238E27FC236}">
+                <a16:creationId xmlns:a16="http://schemas.microsoft.com/office/drawing/2014/main" id="{985B6F7A-C1FF-48E1-8ECF-3F2B79508549}"/>
+              </a:ext>
+            </a:extLst>
+          </p:cNvPr>
+          <p:cNvSpPr>
+            <a:spLocks noGrp="1"/>
+          </p:cNvSpPr>
+          <p:nvPr>
+            <p:ph idx="1"/>
+          </p:nvPr>
+        </p:nvSpPr>
+        <p:spPr/>
+        <p:txBody>
+          <a:bodyPr/>
+          <a:lstStyle/>
+          <a:p>
+            <a:r>
+              <a:rPr lang="pt-PT" dirty="0"/>
+              <a:t>Páginas informativas no website. (</a:t>
+            </a:r>
+            <a:r>
+              <a:rPr lang="pt-PT" dirty="0" err="1"/>
+              <a:t>ex</a:t>
+            </a:r>
+            <a:r>
+              <a:rPr lang="pt-PT" dirty="0"/>
+              <a:t>: Lista de Alimentos e seus </a:t>
+            </a:r>
+            <a:r>
+              <a:rPr lang="pt-PT" dirty="0" err="1"/>
+              <a:t>carbroidratos</a:t>
+            </a:r>
+            <a:r>
+              <a:rPr lang="pt-PT" dirty="0"/>
+              <a:t>, mostrar lista de exercícios detalhadamente, suplementação, </a:t>
+            </a:r>
+            <a:r>
+              <a:rPr lang="pt-PT" dirty="0" err="1"/>
+              <a:t>etc</a:t>
+            </a:r>
+            <a:r>
+              <a:rPr lang="pt-PT"/>
+              <a:t>…)</a:t>
+            </a:r>
+          </a:p>
+          <a:p>
+            <a:endParaRPr lang="pt-PT" dirty="0"/>
+          </a:p>
+          <a:p>
+            <a:r>
+              <a:rPr lang="pt-PT" dirty="0"/>
+              <a:t>Calendário a mostrar planos de treino(mostramos em lista em vez de calendário)</a:t>
+            </a:r>
+          </a:p>
+          <a:p>
+            <a:endParaRPr lang="pt-PT" dirty="0"/>
+          </a:p>
+          <a:p>
+            <a:endParaRPr lang="pt-PT" dirty="0"/>
+          </a:p>
+        </p:txBody>
+      </p:sp>
+    </p:spTree>
+    <p:extLst>
+      <p:ext uri="{BB962C8B-B14F-4D97-AF65-F5344CB8AC3E}">
+        <p14:creationId xmlns:p14="http://schemas.microsoft.com/office/powerpoint/2010/main" val="3158461334"/>
       </p:ext>
     </p:extLst>
   </p:cSld>

</xml_diff>